<commit_message>
Added changes (thanks moth)
</commit_message>
<xml_diff>
--- a/Cookie Clicker.pptx
+++ b/Cookie Clicker.pptx
@@ -12969,7 +12969,7 @@
             </a:pPr>
             <a:r>
               <a:rPr lang="en-GB"/>
-              <a:t>This example shows a secret message 10 seconds after the page loads. We only want to show the message once, so we use a timed function instead with </a:t>
+              <a:t>This example shows a secret message a minute after the page loads. We only want to show the message once, so we use a timed function instead with </a:t>
             </a:r>
             <a:r>
               <a:rPr lang="en-GB">
@@ -13010,18 +13010,17 @@
           <p:cNvPicPr preferRelativeResize="0"/>
           <p:nvPr/>
         </p:nvPicPr>
-        <p:blipFill>
+        <p:blipFill rotWithShape="1">
           <a:blip r:embed="rId3">
             <a:alphaModFix/>
           </a:blip>
-          <a:stretch>
-            <a:fillRect/>
-          </a:stretch>
+          <a:srcRect b="0" l="0" r="51667" t="0"/>
+          <a:stretch/>
         </p:blipFill>
         <p:spPr>
           <a:xfrm>
-            <a:off x="5041150" y="2214925"/>
-            <a:ext cx="3521900" cy="1205025"/>
+            <a:off x="4824550" y="1894563"/>
+            <a:ext cx="4071849" cy="1354375"/>
           </a:xfrm>
           <a:prstGeom prst="rect">
             <a:avLst/>
@@ -13131,7 +13130,20 @@
             </a:pPr>
             <a:r>
               <a:rPr lang="en-GB"/>
-              <a:t>Fill in the missing code in the spawnGoldenCookie() function </a:t>
+              <a:t>Fill in the missing code in the </a:t>
+            </a:r>
+            <a:r>
+              <a:rPr lang="en-GB">
+                <a:latin typeface="Fira Code"/>
+                <a:ea typeface="Fira Code"/>
+                <a:cs typeface="Fira Code"/>
+                <a:sym typeface="Fira Code"/>
+              </a:rPr>
+              <a:t>spawnGoldenCookie()</a:t>
+            </a:r>
+            <a:r>
+              <a:rPr lang="en-GB"/>
+              <a:t> function </a:t>
             </a:r>
             <a:r>
               <a:rPr lang="en-GB"/>
@@ -13288,7 +13300,20 @@
             </a:pPr>
             <a:r>
               <a:rPr lang="en-GB"/>
-              <a:t>Why do we use Math.random() for the values of bonus cookies? How could you skew that to be weighted towards lower numbers?</a:t>
+              <a:t>Why do we use </a:t>
+            </a:r>
+            <a:r>
+              <a:rPr lang="en-GB">
+                <a:latin typeface="Fira Code"/>
+                <a:ea typeface="Fira Code"/>
+                <a:cs typeface="Fira Code"/>
+                <a:sym typeface="Fira Code"/>
+              </a:rPr>
+              <a:t>Math.random()</a:t>
+            </a:r>
+            <a:r>
+              <a:rPr lang="en-GB"/>
+              <a:t> for the values of bonus cookies? How could you skew that to be weighted towards lower numbers?</a:t>
             </a:r>
             <a:br>
               <a:rPr lang="en-GB"/>
@@ -13308,7 +13333,33 @@
             </a:pPr>
             <a:r>
               <a:rPr lang="en-GB"/>
-              <a:t>Why do we use setTimeout() instead of setInterval() for controlling how long a golden cookie stays on screen?</a:t>
+              <a:t>Why do we use </a:t>
+            </a:r>
+            <a:r>
+              <a:rPr lang="en-GB">
+                <a:latin typeface="Fira Code"/>
+                <a:ea typeface="Fira Code"/>
+                <a:cs typeface="Fira Code"/>
+                <a:sym typeface="Fira Code"/>
+              </a:rPr>
+              <a:t>setTimeout()</a:t>
+            </a:r>
+            <a:r>
+              <a:rPr lang="en-GB"/>
+              <a:t> instead of </a:t>
+            </a:r>
+            <a:r>
+              <a:rPr lang="en-GB">
+                <a:latin typeface="Fira Code"/>
+                <a:ea typeface="Fira Code"/>
+                <a:cs typeface="Fira Code"/>
+                <a:sym typeface="Fira Code"/>
+              </a:rPr>
+              <a:t>setInterval()</a:t>
+            </a:r>
+            <a:r>
+              <a:rPr lang="en-GB"/>
+              <a:t> for controlling how long a golden cookie stays on screen?</a:t>
             </a:r>
             <a:br>
               <a:rPr lang="en-GB"/>
@@ -14660,7 +14711,7 @@
             <a:tbl>
               <a:tblPr>
                 <a:noFill/>
-                <a:tableStyleId>{C53DE660-B073-44ED-9A11-5BE802664E49}</a:tableStyleId>
+                <a:tableStyleId>{132A29DD-7B68-45F1-B66F-8E888B3EAFAC}</a:tableStyleId>
               </a:tblPr>
               <a:tblGrid>
                 <a:gridCol w="3014025"/>

</xml_diff>